<commit_message>
add slides about SHA1 collision
</commit_message>
<xml_diff>
--- a/git-story/git-commit-code-review/Presentation1.pptx
+++ b/git-story/git-commit-code-review/Presentation1.pptx
@@ -78,6 +78,8 @@
     <p:sldId id="399" r:id="rId72"/>
     <p:sldId id="337" r:id="rId73"/>
     <p:sldId id="362" r:id="rId74"/>
+    <p:sldId id="421" r:id="rId75"/>
+    <p:sldId id="422" r:id="rId76"/>
   </p:sldIdLst>
   <p:sldSz cx="12192000" cy="6858000"/>
   <p:notesSz cx="6858000" cy="9144000"/>
@@ -315,7 +317,7 @@
           <a:p>
             <a:fld id="{D1A7C883-74E3-4B9D-9F30-DE485678C619}" type="datetimeFigureOut">
               <a:rPr lang="en-US" smtClean="0"/>
-              <a:t>8/20/2015</a:t>
+              <a:t>8/25/2015</a:t>
             </a:fld>
             <a:endParaRPr lang="en-US"/>
           </a:p>
@@ -485,7 +487,7 @@
           <a:p>
             <a:fld id="{D1A7C883-74E3-4B9D-9F30-DE485678C619}" type="datetimeFigureOut">
               <a:rPr lang="en-US" smtClean="0"/>
-              <a:t>8/20/2015</a:t>
+              <a:t>8/25/2015</a:t>
             </a:fld>
             <a:endParaRPr lang="en-US"/>
           </a:p>
@@ -665,7 +667,7 @@
           <a:p>
             <a:fld id="{D1A7C883-74E3-4B9D-9F30-DE485678C619}" type="datetimeFigureOut">
               <a:rPr lang="en-US" smtClean="0"/>
-              <a:t>8/20/2015</a:t>
+              <a:t>8/25/2015</a:t>
             </a:fld>
             <a:endParaRPr lang="en-US"/>
           </a:p>
@@ -835,7 +837,7 @@
           <a:p>
             <a:fld id="{D1A7C883-74E3-4B9D-9F30-DE485678C619}" type="datetimeFigureOut">
               <a:rPr lang="en-US" smtClean="0"/>
-              <a:t>8/20/2015</a:t>
+              <a:t>8/25/2015</a:t>
             </a:fld>
             <a:endParaRPr lang="en-US"/>
           </a:p>
@@ -1088,7 +1090,7 @@
           <a:p>
             <a:fld id="{D1A7C883-74E3-4B9D-9F30-DE485678C619}" type="datetimeFigureOut">
               <a:rPr lang="en-US" smtClean="0"/>
-              <a:t>8/20/2015</a:t>
+              <a:t>8/25/2015</a:t>
             </a:fld>
             <a:endParaRPr lang="en-US"/>
           </a:p>
@@ -1320,7 +1322,7 @@
           <a:p>
             <a:fld id="{D1A7C883-74E3-4B9D-9F30-DE485678C619}" type="datetimeFigureOut">
               <a:rPr lang="en-US" smtClean="0"/>
-              <a:t>8/20/2015</a:t>
+              <a:t>8/25/2015</a:t>
             </a:fld>
             <a:endParaRPr lang="en-US"/>
           </a:p>
@@ -1687,7 +1689,7 @@
           <a:p>
             <a:fld id="{D1A7C883-74E3-4B9D-9F30-DE485678C619}" type="datetimeFigureOut">
               <a:rPr lang="en-US" smtClean="0"/>
-              <a:t>8/20/2015</a:t>
+              <a:t>8/25/2015</a:t>
             </a:fld>
             <a:endParaRPr lang="en-US"/>
           </a:p>
@@ -1805,7 +1807,7 @@
           <a:p>
             <a:fld id="{D1A7C883-74E3-4B9D-9F30-DE485678C619}" type="datetimeFigureOut">
               <a:rPr lang="en-US" smtClean="0"/>
-              <a:t>8/20/2015</a:t>
+              <a:t>8/25/2015</a:t>
             </a:fld>
             <a:endParaRPr lang="en-US"/>
           </a:p>
@@ -1900,7 +1902,7 @@
           <a:p>
             <a:fld id="{D1A7C883-74E3-4B9D-9F30-DE485678C619}" type="datetimeFigureOut">
               <a:rPr lang="en-US" smtClean="0"/>
-              <a:t>8/20/2015</a:t>
+              <a:t>8/25/2015</a:t>
             </a:fld>
             <a:endParaRPr lang="en-US"/>
           </a:p>
@@ -2177,7 +2179,7 @@
           <a:p>
             <a:fld id="{D1A7C883-74E3-4B9D-9F30-DE485678C619}" type="datetimeFigureOut">
               <a:rPr lang="en-US" smtClean="0"/>
-              <a:t>8/20/2015</a:t>
+              <a:t>8/25/2015</a:t>
             </a:fld>
             <a:endParaRPr lang="en-US"/>
           </a:p>
@@ -2430,7 +2432,7 @@
           <a:p>
             <a:fld id="{D1A7C883-74E3-4B9D-9F30-DE485678C619}" type="datetimeFigureOut">
               <a:rPr lang="en-US" smtClean="0"/>
-              <a:t>8/20/2015</a:t>
+              <a:t>8/25/2015</a:t>
             </a:fld>
             <a:endParaRPr lang="en-US"/>
           </a:p>
@@ -2643,7 +2645,7 @@
           <a:p>
             <a:fld id="{D1A7C883-74E3-4B9D-9F30-DE485678C619}" type="datetimeFigureOut">
               <a:rPr lang="en-US" smtClean="0"/>
-              <a:t>8/20/2015</a:t>
+              <a:t>8/25/2015</a:t>
             </a:fld>
             <a:endParaRPr lang="en-US"/>
           </a:p>
@@ -15565,15 +15567,7 @@
             </a:pPr>
             <a:r>
               <a:rPr lang="ru-RU" dirty="0" smtClean="0"/>
-              <a:t>Почти получилась – </a:t>
-            </a:r>
-            <a:r>
-              <a:rPr lang="ru-RU" dirty="0" smtClean="0"/>
-              <a:t>децентрализованная система контроля версий</a:t>
-            </a:r>
-            <a:r>
-              <a:rPr lang="ru-RU" dirty="0" smtClean="0"/>
-              <a:t>.</a:t>
+              <a:t>Почти получилась – децентрализованная система контроля версий.</a:t>
             </a:r>
           </a:p>
         </p:txBody>
@@ -15655,15 +15649,7 @@
             </a:r>
             <a:r>
               <a:rPr lang="ru-RU" dirty="0" smtClean="0"/>
-              <a:t>ожно </a:t>
-            </a:r>
-            <a:r>
-              <a:rPr lang="ru-RU" dirty="0" smtClean="0"/>
-              <a:t>работать </a:t>
-            </a:r>
-            <a:r>
-              <a:rPr lang="ru-RU" dirty="0" smtClean="0"/>
-              <a:t>параллельно</a:t>
+              <a:t>ожно работать параллельно</a:t>
             </a:r>
           </a:p>
           <a:p>
@@ -15674,7 +15660,6 @@
               <a:rPr lang="ru-RU" dirty="0" smtClean="0"/>
               <a:t>Офлайн</a:t>
             </a:r>
-            <a:endParaRPr lang="ru-RU" dirty="0" smtClean="0"/>
           </a:p>
           <a:p>
             <a:pPr marL="0" indent="0">
@@ -15686,13 +15671,8 @@
             </a:r>
             <a:r>
               <a:rPr lang="ru-RU" dirty="0" smtClean="0"/>
-              <a:t>ыстро </a:t>
-            </a:r>
-            <a:r>
-              <a:rPr lang="ru-RU" dirty="0" smtClean="0"/>
-              <a:t>смотреть историю и т.д. </a:t>
-            </a:r>
-            <a:endParaRPr lang="ru-RU" dirty="0" smtClean="0"/>
+              <a:t>ыстро смотреть историю и т.д. </a:t>
+            </a:r>
           </a:p>
         </p:txBody>
       </p:sp>
@@ -16792,7 +16772,6 @@
               <a:rPr lang="en-US" dirty="0" smtClean="0"/>
               <a:t> </a:t>
             </a:r>
-            <a:endParaRPr lang="en-US" dirty="0" smtClean="0"/>
           </a:p>
         </p:txBody>
       </p:sp>
@@ -18967,11 +18946,7 @@
           <a:p>
             <a:r>
               <a:rPr lang="ru-RU" dirty="0" smtClean="0"/>
-              <a:t>Определим правила </a:t>
-            </a:r>
-            <a:r>
-              <a:rPr lang="ru-RU" dirty="0" smtClean="0"/>
-              <a:t>для </a:t>
+              <a:t>Определим правила для </a:t>
             </a:r>
             <a:r>
               <a:rPr lang="ru-RU" dirty="0" err="1" smtClean="0"/>
@@ -19387,11 +19362,7 @@
           <a:p>
             <a:r>
               <a:rPr lang="ru-RU" dirty="0" smtClean="0"/>
-              <a:t>Но на </a:t>
-            </a:r>
-            <a:r>
-              <a:rPr lang="ru-RU" dirty="0" smtClean="0"/>
-              <a:t>этом проблемы не заканчиваются</a:t>
+              <a:t>Но на этом проблемы не заканчиваются</a:t>
             </a:r>
             <a:endParaRPr lang="en-US" dirty="0"/>
           </a:p>
@@ -22385,11 +22356,7 @@
             </a:r>
             <a:r>
               <a:rPr lang="ru-RU" dirty="0" smtClean="0"/>
-              <a:t> около 2х недель</a:t>
-            </a:r>
-            <a:r>
-              <a:rPr lang="ru-RU" dirty="0" smtClean="0"/>
-              <a:t>)</a:t>
+              <a:t> около 2х недель)</a:t>
             </a:r>
           </a:p>
           <a:p>
@@ -22468,19 +22435,11 @@
             </a:r>
             <a:r>
               <a:rPr lang="ru-RU" dirty="0" smtClean="0"/>
-              <a:t>по </a:t>
-            </a:r>
-            <a:r>
-              <a:rPr lang="ru-RU" dirty="0" smtClean="0"/>
-              <a:t>сути</a:t>
+              <a:t>по сути</a:t>
             </a:r>
             <a:r>
               <a:rPr lang="en-US" dirty="0" smtClean="0"/>
-              <a:t> </a:t>
-            </a:r>
-            <a:r>
-              <a:rPr lang="en-US" dirty="0" smtClean="0"/>
-              <a:t>merge</a:t>
+              <a:t> merge</a:t>
             </a:r>
             <a:r>
               <a:rPr lang="ru-RU" dirty="0" smtClean="0"/>
@@ -23081,11 +23040,7 @@
           <a:p>
             <a:r>
               <a:rPr lang="ru-RU" dirty="0" smtClean="0"/>
-              <a:t>История и её </a:t>
-            </a:r>
-            <a:r>
-              <a:rPr lang="ru-RU" dirty="0" smtClean="0"/>
-              <a:t>переписывание</a:t>
+              <a:t>История и её переписывание</a:t>
             </a:r>
             <a:endParaRPr lang="en-US" dirty="0">
               <a:solidFill>
@@ -23946,6 +23901,167 @@
       </p:par>
     </p:tnLst>
   </p:timing>
+</p:sld>
+</file>
+
+<file path=ppt/slides/slide74.xml><?xml version="1.0" encoding="utf-8"?>
+<p:sld xmlns:a="http://schemas.openxmlformats.org/drawingml/2006/main" xmlns:r="http://schemas.openxmlformats.org/officeDocument/2006/relationships" xmlns:p="http://schemas.openxmlformats.org/presentationml/2006/main">
+  <p:cSld>
+    <p:spTree>
+      <p:nvGrpSpPr>
+        <p:cNvPr id="1" name=""/>
+        <p:cNvGrpSpPr/>
+        <p:nvPr/>
+      </p:nvGrpSpPr>
+      <p:grpSpPr>
+        <a:xfrm>
+          <a:off x="0" y="0"/>
+          <a:ext cx="0" cy="0"/>
+          <a:chOff x="0" y="0"/>
+          <a:chExt cx="0" cy="0"/>
+        </a:xfrm>
+      </p:grpSpPr>
+      <p:sp>
+        <p:nvSpPr>
+          <p:cNvPr id="2" name="Title 1"/>
+          <p:cNvSpPr>
+            <a:spLocks noGrp="1"/>
+          </p:cNvSpPr>
+          <p:nvPr>
+            <p:ph type="title"/>
+          </p:nvPr>
+        </p:nvSpPr>
+        <p:spPr/>
+        <p:txBody>
+          <a:bodyPr/>
+          <a:lstStyle/>
+          <a:p>
+            <a:r>
+              <a:rPr lang="en-US" dirty="0" smtClean="0"/>
+              <a:t>TODO	</a:t>
+            </a:r>
+            <a:endParaRPr lang="en-US" dirty="0"/>
+          </a:p>
+        </p:txBody>
+      </p:sp>
+      <p:sp>
+        <p:nvSpPr>
+          <p:cNvPr id="3" name="Content Placeholder 2"/>
+          <p:cNvSpPr>
+            <a:spLocks noGrp="1"/>
+          </p:cNvSpPr>
+          <p:nvPr>
+            <p:ph idx="1"/>
+          </p:nvPr>
+        </p:nvSpPr>
+        <p:spPr/>
+        <p:txBody>
+          <a:bodyPr/>
+          <a:lstStyle/>
+          <a:p>
+            <a:pPr marL="0" indent="0">
+              <a:buNone/>
+            </a:pPr>
+            <a:r>
+              <a:rPr lang="en-US" dirty="0"/>
+              <a:t>http://fle.github.io/git-tip-keep-your-branch-clean-with-fixup-and-autosquash.html</a:t>
+            </a:r>
+          </a:p>
+        </p:txBody>
+      </p:sp>
+    </p:spTree>
+    <p:extLst>
+      <p:ext uri="{BB962C8B-B14F-4D97-AF65-F5344CB8AC3E}">
+        <p14:creationId xmlns:p14="http://schemas.microsoft.com/office/powerpoint/2010/main" val="1170151408"/>
+      </p:ext>
+    </p:extLst>
+  </p:cSld>
+  <p:clrMapOvr>
+    <a:masterClrMapping/>
+  </p:clrMapOvr>
+</p:sld>
+</file>
+
+<file path=ppt/slides/slide75.xml><?xml version="1.0" encoding="utf-8"?>
+<p:sld xmlns:a="http://schemas.openxmlformats.org/drawingml/2006/main" xmlns:r="http://schemas.openxmlformats.org/officeDocument/2006/relationships" xmlns:p="http://schemas.openxmlformats.org/presentationml/2006/main">
+  <p:cSld>
+    <p:spTree>
+      <p:nvGrpSpPr>
+        <p:cNvPr id="1" name=""/>
+        <p:cNvGrpSpPr/>
+        <p:nvPr/>
+      </p:nvGrpSpPr>
+      <p:grpSpPr>
+        <a:xfrm>
+          <a:off x="0" y="0"/>
+          <a:ext cx="0" cy="0"/>
+          <a:chOff x="0" y="0"/>
+          <a:chExt cx="0" cy="0"/>
+        </a:xfrm>
+      </p:grpSpPr>
+      <p:sp>
+        <p:nvSpPr>
+          <p:cNvPr id="2" name="Title 1"/>
+          <p:cNvSpPr>
+            <a:spLocks noGrp="1"/>
+          </p:cNvSpPr>
+          <p:nvPr>
+            <p:ph type="title"/>
+          </p:nvPr>
+        </p:nvSpPr>
+        <p:spPr/>
+        <p:txBody>
+          <a:bodyPr/>
+          <a:lstStyle/>
+          <a:p>
+            <a:r>
+              <a:rPr lang="en-US" dirty="0" smtClean="0"/>
+              <a:t>TODO	</a:t>
+            </a:r>
+            <a:endParaRPr lang="en-US" dirty="0"/>
+          </a:p>
+        </p:txBody>
+      </p:sp>
+      <p:sp>
+        <p:nvSpPr>
+          <p:cNvPr id="3" name="Content Placeholder 2"/>
+          <p:cNvSpPr>
+            <a:spLocks noGrp="1"/>
+          </p:cNvSpPr>
+          <p:nvPr>
+            <p:ph idx="1"/>
+          </p:nvPr>
+        </p:nvSpPr>
+        <p:spPr/>
+        <p:txBody>
+          <a:bodyPr/>
+          <a:lstStyle/>
+          <a:p>
+            <a:pPr marL="0" indent="0">
+              <a:buNone/>
+            </a:pPr>
+            <a:r>
+              <a:rPr lang="en-US" dirty="0" err="1" smtClean="0"/>
+              <a:t>Webstorm</a:t>
+            </a:r>
+            <a:r>
+              <a:rPr lang="en-US" smtClean="0"/>
+              <a:t> features</a:t>
+            </a:r>
+            <a:endParaRPr lang="en-US"/>
+          </a:p>
+        </p:txBody>
+      </p:sp>
+    </p:spTree>
+    <p:extLst>
+      <p:ext uri="{BB962C8B-B14F-4D97-AF65-F5344CB8AC3E}">
+        <p14:creationId xmlns:p14="http://schemas.microsoft.com/office/powerpoint/2010/main" val="1485853268"/>
+      </p:ext>
+    </p:extLst>
+  </p:cSld>
+  <p:clrMapOvr>
+    <a:masterClrMapping/>
+  </p:clrMapOvr>
 </p:sld>
 </file>
 

</xml_diff>